<commit_message>
moving stuff between macro assignments
</commit_message>
<xml_diff>
--- a/ClassMaterials/Macros1/Macros.pptx
+++ b/ClassMaterials/Macros1/Macros.pptx
@@ -5,7 +5,7 @@
     <p:sldMasterId id="2147483648" r:id="rId4"/>
   </p:sldMasterIdLst>
   <p:notesMasterIdLst>
-    <p:notesMasterId r:id="rId15"/>
+    <p:notesMasterId r:id="rId12"/>
   </p:notesMasterIdLst>
   <p:sldIdLst>
     <p:sldId id="256" r:id="rId5"/>
@@ -15,9 +15,6 @@
     <p:sldId id="260" r:id="rId9"/>
     <p:sldId id="261" r:id="rId10"/>
     <p:sldId id="265" r:id="rId11"/>
-    <p:sldId id="262" r:id="rId12"/>
-    <p:sldId id="263" r:id="rId13"/>
-    <p:sldId id="264" r:id="rId14"/>
   </p:sldIdLst>
   <p:sldSz cx="12192000" cy="6858000"/>
   <p:notesSz cx="6858000" cy="9144000"/>
@@ -485,7 +482,7 @@
           <a:p>
             <a:fld id="{4D26DBD6-5EBA-46AF-AD37-89110B118845}" type="datetimeFigureOut">
               <a:rPr lang="en-US" smtClean="0"/>
-              <a:t>10/8/2024</a:t>
+              <a:t>10/13/2024</a:t>
             </a:fld>
             <a:endParaRPr lang="en-US"/>
           </a:p>
@@ -752,106 +749,6 @@
 </p:notesMaster>
 </file>
 
-<file path=ppt/notesSlides/notesSlide1.xml><?xml version="1.0" encoding="utf-8"?>
-<p:notes xmlns:a="http://schemas.openxmlformats.org/drawingml/2006/main" xmlns:r="http://schemas.openxmlformats.org/officeDocument/2006/relationships" xmlns:p="http://schemas.openxmlformats.org/presentationml/2006/main">
-  <p:cSld>
-    <p:spTree>
-      <p:nvGrpSpPr>
-        <p:cNvPr id="1" name=""/>
-        <p:cNvGrpSpPr/>
-        <p:nvPr/>
-      </p:nvGrpSpPr>
-      <p:grpSpPr>
-        <a:xfrm>
-          <a:off x="0" y="0"/>
-          <a:ext cx="0" cy="0"/>
-          <a:chOff x="0" y="0"/>
-          <a:chExt cx="0" cy="0"/>
-        </a:xfrm>
-      </p:grpSpPr>
-      <p:sp>
-        <p:nvSpPr>
-          <p:cNvPr id="2" name="Slide Image Placeholder 1"/>
-          <p:cNvSpPr>
-            <a:spLocks noGrp="1" noRot="1" noChangeAspect="1"/>
-          </p:cNvSpPr>
-          <p:nvPr>
-            <p:ph type="sldImg"/>
-          </p:nvPr>
-        </p:nvSpPr>
-        <p:spPr/>
-      </p:sp>
-      <p:sp>
-        <p:nvSpPr>
-          <p:cNvPr id="3" name="Notes Placeholder 2"/>
-          <p:cNvSpPr>
-            <a:spLocks noGrp="1"/>
-          </p:cNvSpPr>
-          <p:nvPr>
-            <p:ph type="body" idx="1"/>
-          </p:nvPr>
-        </p:nvSpPr>
-        <p:spPr/>
-        <p:txBody>
-          <a:bodyPr/>
-          <a:lstStyle/>
-          <a:p>
-            <a:r>
-              <a:rPr lang="en-US" dirty="0"/>
-              <a:t>It’s because </a:t>
-            </a:r>
-            <a:r>
-              <a:rPr lang="en-US"/>
-              <a:t>we repeatedly </a:t>
-            </a:r>
-            <a:r>
-              <a:rPr lang="en-US" dirty="0"/>
-              <a:t>eval </a:t>
-            </a:r>
-            <a:r>
-              <a:rPr lang="en-US" dirty="0" err="1"/>
-              <a:t>numExp</a:t>
-            </a:r>
-            <a:endParaRPr lang="en-US" dirty="0"/>
-          </a:p>
-        </p:txBody>
-      </p:sp>
-      <p:sp>
-        <p:nvSpPr>
-          <p:cNvPr id="4" name="Slide Number Placeholder 3"/>
-          <p:cNvSpPr>
-            <a:spLocks noGrp="1"/>
-          </p:cNvSpPr>
-          <p:nvPr>
-            <p:ph type="sldNum" sz="quarter" idx="5"/>
-          </p:nvPr>
-        </p:nvSpPr>
-        <p:spPr/>
-        <p:txBody>
-          <a:bodyPr/>
-          <a:lstStyle/>
-          <a:p>
-            <a:fld id="{A518B385-3378-4827-9582-BFC8C93E3163}" type="slidenum">
-              <a:rPr lang="en-US" smtClean="0"/>
-              <a:t>10</a:t>
-            </a:fld>
-            <a:endParaRPr lang="en-US"/>
-          </a:p>
-        </p:txBody>
-      </p:sp>
-    </p:spTree>
-    <p:extLst>
-      <p:ext uri="{BB962C8B-B14F-4D97-AF65-F5344CB8AC3E}">
-        <p14:creationId xmlns:p14="http://schemas.microsoft.com/office/powerpoint/2010/main" val="694463619"/>
-      </p:ext>
-    </p:extLst>
-  </p:cSld>
-  <p:clrMapOvr>
-    <a:masterClrMapping/>
-  </p:clrMapOvr>
-</p:notes>
-</file>
-
 <file path=ppt/slideLayouts/slideLayout1.xml><?xml version="1.0" encoding="utf-8"?>
 <p:sldLayout xmlns:a="http://schemas.openxmlformats.org/drawingml/2006/main" xmlns:r="http://schemas.openxmlformats.org/officeDocument/2006/relationships" xmlns:p="http://schemas.openxmlformats.org/presentationml/2006/main" type="title" preserve="1">
   <p:cSld name="Title Slide">
@@ -999,7 +896,7 @@
           <a:p>
             <a:fld id="{2B61D1F8-E98D-496F-83D0-5581616A7132}" type="datetimeFigureOut">
               <a:rPr lang="en-US" smtClean="0"/>
-              <a:t>10/8/2024</a:t>
+              <a:t>10/13/2024</a:t>
             </a:fld>
             <a:endParaRPr lang="en-US"/>
           </a:p>
@@ -1197,7 +1094,7 @@
           <a:p>
             <a:fld id="{2B61D1F8-E98D-496F-83D0-5581616A7132}" type="datetimeFigureOut">
               <a:rPr lang="en-US" smtClean="0"/>
-              <a:t>10/8/2024</a:t>
+              <a:t>10/13/2024</a:t>
             </a:fld>
             <a:endParaRPr lang="en-US"/>
           </a:p>
@@ -1405,7 +1302,7 @@
           <a:p>
             <a:fld id="{2B61D1F8-E98D-496F-83D0-5581616A7132}" type="datetimeFigureOut">
               <a:rPr lang="en-US" smtClean="0"/>
-              <a:t>10/8/2024</a:t>
+              <a:t>10/13/2024</a:t>
             </a:fld>
             <a:endParaRPr lang="en-US"/>
           </a:p>
@@ -1603,7 +1500,7 @@
           <a:p>
             <a:fld id="{2B61D1F8-E98D-496F-83D0-5581616A7132}" type="datetimeFigureOut">
               <a:rPr lang="en-US" smtClean="0"/>
-              <a:t>10/8/2024</a:t>
+              <a:t>10/13/2024</a:t>
             </a:fld>
             <a:endParaRPr lang="en-US"/>
           </a:p>
@@ -1878,7 +1775,7 @@
           <a:p>
             <a:fld id="{2B61D1F8-E98D-496F-83D0-5581616A7132}" type="datetimeFigureOut">
               <a:rPr lang="en-US" smtClean="0"/>
-              <a:t>10/8/2024</a:t>
+              <a:t>10/13/2024</a:t>
             </a:fld>
             <a:endParaRPr lang="en-US"/>
           </a:p>
@@ -2143,7 +2040,7 @@
           <a:p>
             <a:fld id="{2B61D1F8-E98D-496F-83D0-5581616A7132}" type="datetimeFigureOut">
               <a:rPr lang="en-US" smtClean="0"/>
-              <a:t>10/8/2024</a:t>
+              <a:t>10/13/2024</a:t>
             </a:fld>
             <a:endParaRPr lang="en-US"/>
           </a:p>
@@ -2555,7 +2452,7 @@
           <a:p>
             <a:fld id="{2B61D1F8-E98D-496F-83D0-5581616A7132}" type="datetimeFigureOut">
               <a:rPr lang="en-US" smtClean="0"/>
-              <a:t>10/8/2024</a:t>
+              <a:t>10/13/2024</a:t>
             </a:fld>
             <a:endParaRPr lang="en-US"/>
           </a:p>
@@ -2696,7 +2593,7 @@
           <a:p>
             <a:fld id="{2B61D1F8-E98D-496F-83D0-5581616A7132}" type="datetimeFigureOut">
               <a:rPr lang="en-US" smtClean="0"/>
-              <a:t>10/8/2024</a:t>
+              <a:t>10/13/2024</a:t>
             </a:fld>
             <a:endParaRPr lang="en-US"/>
           </a:p>
@@ -2809,7 +2706,7 @@
           <a:p>
             <a:fld id="{2B61D1F8-E98D-496F-83D0-5581616A7132}" type="datetimeFigureOut">
               <a:rPr lang="en-US" smtClean="0"/>
-              <a:t>10/8/2024</a:t>
+              <a:t>10/13/2024</a:t>
             </a:fld>
             <a:endParaRPr lang="en-US"/>
           </a:p>
@@ -3120,7 +3017,7 @@
           <a:p>
             <a:fld id="{2B61D1F8-E98D-496F-83D0-5581616A7132}" type="datetimeFigureOut">
               <a:rPr lang="en-US" smtClean="0"/>
-              <a:t>10/8/2024</a:t>
+              <a:t>10/13/2024</a:t>
             </a:fld>
             <a:endParaRPr lang="en-US"/>
           </a:p>
@@ -3408,7 +3305,7 @@
           <a:p>
             <a:fld id="{2B61D1F8-E98D-496F-83D0-5581616A7132}" type="datetimeFigureOut">
               <a:rPr lang="en-US" smtClean="0"/>
-              <a:t>10/8/2024</a:t>
+              <a:t>10/13/2024</a:t>
             </a:fld>
             <a:endParaRPr lang="en-US"/>
           </a:p>
@@ -3649,7 +3546,7 @@
           <a:p>
             <a:fld id="{2B61D1F8-E98D-496F-83D0-5581616A7132}" type="datetimeFigureOut">
               <a:rPr lang="en-US" smtClean="0"/>
-              <a:t>10/8/2024</a:t>
+              <a:t>10/13/2024</a:t>
             </a:fld>
             <a:endParaRPr lang="en-US"/>
           </a:p>
@@ -4752,283 +4649,6 @@
 </p:sld>
 </file>
 
-<file path=ppt/slides/slide10.xml><?xml version="1.0" encoding="utf-8"?>
-<p:sld xmlns:a="http://schemas.openxmlformats.org/drawingml/2006/main" xmlns:r="http://schemas.openxmlformats.org/officeDocument/2006/relationships" xmlns:p="http://schemas.openxmlformats.org/presentationml/2006/main">
-  <p:cSld>
-    <p:spTree>
-      <p:nvGrpSpPr>
-        <p:cNvPr id="1" name=""/>
-        <p:cNvGrpSpPr/>
-        <p:nvPr/>
-      </p:nvGrpSpPr>
-      <p:grpSpPr>
-        <a:xfrm>
-          <a:off x="0" y="0"/>
-          <a:ext cx="0" cy="0"/>
-          <a:chOff x="0" y="0"/>
-          <a:chExt cx="0" cy="0"/>
-        </a:xfrm>
-      </p:grpSpPr>
-      <p:sp>
-        <p:nvSpPr>
-          <p:cNvPr id="2" name="Title 1">
-            <a:extLst>
-              <a:ext uri="{FF2B5EF4-FFF2-40B4-BE49-F238E27FC236}">
-                <a16:creationId xmlns:a16="http://schemas.microsoft.com/office/drawing/2014/main" id="{6ED19C5D-7EEC-4D10-8DD6-9BC00F804509}"/>
-              </a:ext>
-            </a:extLst>
-          </p:cNvPr>
-          <p:cNvSpPr>
-            <a:spLocks noGrp="1"/>
-          </p:cNvSpPr>
-          <p:nvPr>
-            <p:ph type="title"/>
-          </p:nvPr>
-        </p:nvSpPr>
-        <p:spPr/>
-        <p:txBody>
-          <a:bodyPr/>
-          <a:lstStyle/>
-          <a:p>
-            <a:r>
-              <a:rPr lang="en-US" dirty="0"/>
-              <a:t>Macros have edge cases</a:t>
-            </a:r>
-          </a:p>
-        </p:txBody>
-      </p:sp>
-      <p:sp>
-        <p:nvSpPr>
-          <p:cNvPr id="4" name="Rectangle 3">
-            <a:extLst>
-              <a:ext uri="{FF2B5EF4-FFF2-40B4-BE49-F238E27FC236}">
-                <a16:creationId xmlns:a16="http://schemas.microsoft.com/office/drawing/2014/main" id="{FF38F809-5A71-4016-AF15-9C5188838E6E}"/>
-              </a:ext>
-            </a:extLst>
-          </p:cNvPr>
-          <p:cNvSpPr/>
-          <p:nvPr/>
-        </p:nvSpPr>
-        <p:spPr>
-          <a:xfrm>
-            <a:off x="419100" y="1905506"/>
-            <a:ext cx="11353800" cy="3046988"/>
-          </a:xfrm>
-          <a:prstGeom prst="rect">
-            <a:avLst/>
-          </a:prstGeom>
-        </p:spPr>
-        <p:txBody>
-          <a:bodyPr wrap="square">
-            <a:spAutoFit/>
-          </a:bodyPr>
-          <a:lstStyle/>
-          <a:p>
-            <a:r>
-              <a:rPr lang="en-US" sz="2400" dirty="0">
-                <a:latin typeface="Consolas" panose="020B0609020204030204" pitchFamily="49" charset="0"/>
-              </a:rPr>
-              <a:t>(define-syntax (repeat </a:t>
-            </a:r>
-            <a:r>
-              <a:rPr lang="en-US" sz="2400" dirty="0" err="1">
-                <a:latin typeface="Consolas" panose="020B0609020204030204" pitchFamily="49" charset="0"/>
-              </a:rPr>
-              <a:t>stx</a:t>
-            </a:r>
-            <a:r>
-              <a:rPr lang="en-US" sz="2400" dirty="0">
-                <a:latin typeface="Consolas" panose="020B0609020204030204" pitchFamily="49" charset="0"/>
-              </a:rPr>
-              <a:t>)</a:t>
-            </a:r>
-          </a:p>
-          <a:p>
-            <a:r>
-              <a:rPr lang="en-US" sz="2400" dirty="0">
-                <a:latin typeface="Consolas" panose="020B0609020204030204" pitchFamily="49" charset="0"/>
-              </a:rPr>
-              <a:t>  (syntax-case </a:t>
-            </a:r>
-            <a:r>
-              <a:rPr lang="en-US" sz="2400" dirty="0" err="1">
-                <a:latin typeface="Consolas" panose="020B0609020204030204" pitchFamily="49" charset="0"/>
-              </a:rPr>
-              <a:t>stx</a:t>
-            </a:r>
-            <a:r>
-              <a:rPr lang="en-US" sz="2400" dirty="0">
-                <a:latin typeface="Consolas" panose="020B0609020204030204" pitchFamily="49" charset="0"/>
-              </a:rPr>
-              <a:t> ()</a:t>
-            </a:r>
-          </a:p>
-          <a:p>
-            <a:r>
-              <a:rPr lang="en-US" sz="2400" dirty="0">
-                <a:latin typeface="Consolas" panose="020B0609020204030204" pitchFamily="49" charset="0"/>
-              </a:rPr>
-              <a:t>    [(_ </a:t>
-            </a:r>
-            <a:r>
-              <a:rPr lang="en-US" sz="2400" dirty="0" err="1">
-                <a:latin typeface="Consolas" panose="020B0609020204030204" pitchFamily="49" charset="0"/>
-              </a:rPr>
-              <a:t>numExp</a:t>
-            </a:r>
-            <a:r>
-              <a:rPr lang="en-US" sz="2400" dirty="0">
-                <a:latin typeface="Consolas" panose="020B0609020204030204" pitchFamily="49" charset="0"/>
-              </a:rPr>
-              <a:t> </a:t>
-            </a:r>
-            <a:r>
-              <a:rPr lang="en-US" sz="2400" dirty="0" err="1">
-                <a:latin typeface="Consolas" panose="020B0609020204030204" pitchFamily="49" charset="0"/>
-              </a:rPr>
-              <a:t>repeatExp</a:t>
-            </a:r>
-            <a:r>
-              <a:rPr lang="en-US" sz="2400" dirty="0">
-                <a:latin typeface="Consolas" panose="020B0609020204030204" pitchFamily="49" charset="0"/>
-              </a:rPr>
-              <a:t> ) #'(let </a:t>
-            </a:r>
-            <a:r>
-              <a:rPr lang="en-US" sz="2400" dirty="0" err="1">
-                <a:latin typeface="Consolas" panose="020B0609020204030204" pitchFamily="49" charset="0"/>
-              </a:rPr>
-              <a:t>repeatme</a:t>
-            </a:r>
-            <a:r>
-              <a:rPr lang="en-US" sz="2400" dirty="0">
-                <a:latin typeface="Consolas" panose="020B0609020204030204" pitchFamily="49" charset="0"/>
-              </a:rPr>
-              <a:t> ((count 0))</a:t>
-            </a:r>
-          </a:p>
-          <a:p>
-            <a:r>
-              <a:rPr lang="en-US" sz="2400" dirty="0">
-                <a:latin typeface="Consolas" panose="020B0609020204030204" pitchFamily="49" charset="0"/>
-              </a:rPr>
-              <a:t>                               (if (= count </a:t>
-            </a:r>
-            <a:r>
-              <a:rPr lang="en-US" sz="2400" dirty="0" err="1">
-                <a:latin typeface="Consolas" panose="020B0609020204030204" pitchFamily="49" charset="0"/>
-              </a:rPr>
-              <a:t>numExp</a:t>
-            </a:r>
-            <a:r>
-              <a:rPr lang="en-US" sz="2400" dirty="0">
-                <a:latin typeface="Consolas" panose="020B0609020204030204" pitchFamily="49" charset="0"/>
-              </a:rPr>
-              <a:t>)</a:t>
-            </a:r>
-          </a:p>
-          <a:p>
-            <a:r>
-              <a:rPr lang="en-US" sz="2400" dirty="0">
-                <a:latin typeface="Consolas" panose="020B0609020204030204" pitchFamily="49" charset="0"/>
-              </a:rPr>
-              <a:t>                                   (void)</a:t>
-            </a:r>
-          </a:p>
-          <a:p>
-            <a:r>
-              <a:rPr lang="en-US" sz="2400" dirty="0">
-                <a:latin typeface="Consolas" panose="020B0609020204030204" pitchFamily="49" charset="0"/>
-              </a:rPr>
-              <a:t>                                   (begin</a:t>
-            </a:r>
-          </a:p>
-          <a:p>
-            <a:r>
-              <a:rPr lang="en-US" sz="2400" dirty="0">
-                <a:latin typeface="Consolas" panose="020B0609020204030204" pitchFamily="49" charset="0"/>
-              </a:rPr>
-              <a:t>                                     </a:t>
-            </a:r>
-            <a:r>
-              <a:rPr lang="en-US" sz="2400" dirty="0" err="1">
-                <a:latin typeface="Consolas" panose="020B0609020204030204" pitchFamily="49" charset="0"/>
-              </a:rPr>
-              <a:t>repeatExp</a:t>
-            </a:r>
-            <a:endParaRPr lang="en-US" sz="2400" dirty="0">
-              <a:latin typeface="Consolas" panose="020B0609020204030204" pitchFamily="49" charset="0"/>
-            </a:endParaRPr>
-          </a:p>
-          <a:p>
-            <a:r>
-              <a:rPr lang="en-US" sz="2400" dirty="0">
-                <a:latin typeface="Consolas" panose="020B0609020204030204" pitchFamily="49" charset="0"/>
-              </a:rPr>
-              <a:t>                                     (</a:t>
-            </a:r>
-            <a:r>
-              <a:rPr lang="en-US" sz="2400" dirty="0" err="1">
-                <a:latin typeface="Consolas" panose="020B0609020204030204" pitchFamily="49" charset="0"/>
-              </a:rPr>
-              <a:t>repeatme</a:t>
-            </a:r>
-            <a:r>
-              <a:rPr lang="en-US" sz="2400" dirty="0">
-                <a:latin typeface="Consolas" panose="020B0609020204030204" pitchFamily="49" charset="0"/>
-              </a:rPr>
-              <a:t> (add1 count)))))]))</a:t>
-            </a:r>
-          </a:p>
-        </p:txBody>
-      </p:sp>
-      <p:sp>
-        <p:nvSpPr>
-          <p:cNvPr id="5" name="Rectangle 4">
-            <a:extLst>
-              <a:ext uri="{FF2B5EF4-FFF2-40B4-BE49-F238E27FC236}">
-                <a16:creationId xmlns:a16="http://schemas.microsoft.com/office/drawing/2014/main" id="{9CE2229F-D572-49EB-A7B6-35233BB40769}"/>
-              </a:ext>
-            </a:extLst>
-          </p:cNvPr>
-          <p:cNvSpPr/>
-          <p:nvPr/>
-        </p:nvSpPr>
-        <p:spPr>
-          <a:xfrm>
-            <a:off x="419099" y="5698166"/>
-            <a:ext cx="10264333" cy="369332"/>
-          </a:xfrm>
-          <a:prstGeom prst="rect">
-            <a:avLst/>
-          </a:prstGeom>
-        </p:spPr>
-        <p:txBody>
-          <a:bodyPr wrap="square">
-            <a:spAutoFit/>
-          </a:bodyPr>
-          <a:lstStyle/>
-          <a:p>
-            <a:r>
-              <a:rPr lang="en-US" dirty="0"/>
-              <a:t>If you can out why this is buggy, rewrite it in the in class exercises to be correct.</a:t>
-            </a:r>
-          </a:p>
-        </p:txBody>
-      </p:sp>
-    </p:spTree>
-    <p:extLst>
-      <p:ext uri="{BB962C8B-B14F-4D97-AF65-F5344CB8AC3E}">
-        <p14:creationId xmlns:p14="http://schemas.microsoft.com/office/powerpoint/2010/main" val="3991979242"/>
-      </p:ext>
-    </p:extLst>
-  </p:cSld>
-  <p:clrMapOvr>
-    <a:masterClrMapping/>
-  </p:clrMapOvr>
-</p:sld>
-</file>
-
 <file path=ppt/slides/slide2.xml><?xml version="1.0" encoding="utf-8"?>
 <p:sld xmlns:a="http://schemas.openxmlformats.org/drawingml/2006/main" xmlns:r="http://schemas.openxmlformats.org/officeDocument/2006/relationships" xmlns:p="http://schemas.openxmlformats.org/presentationml/2006/main">
   <p:cSld>
@@ -6236,420 +5856,6 @@
     <p:extLst>
       <p:ext uri="{BB962C8B-B14F-4D97-AF65-F5344CB8AC3E}">
         <p14:creationId xmlns:p14="http://schemas.microsoft.com/office/powerpoint/2010/main" val="2514696384"/>
-      </p:ext>
-    </p:extLst>
-  </p:cSld>
-  <p:clrMapOvr>
-    <a:masterClrMapping/>
-  </p:clrMapOvr>
-</p:sld>
-</file>
-
-<file path=ppt/slides/slide8.xml><?xml version="1.0" encoding="utf-8"?>
-<p:sld xmlns:a="http://schemas.openxmlformats.org/drawingml/2006/main" xmlns:r="http://schemas.openxmlformats.org/officeDocument/2006/relationships" xmlns:p="http://schemas.openxmlformats.org/presentationml/2006/main">
-  <p:cSld>
-    <p:spTree>
-      <p:nvGrpSpPr>
-        <p:cNvPr id="1" name=""/>
-        <p:cNvGrpSpPr/>
-        <p:nvPr/>
-      </p:nvGrpSpPr>
-      <p:grpSpPr>
-        <a:xfrm>
-          <a:off x="0" y="0"/>
-          <a:ext cx="0" cy="0"/>
-          <a:chOff x="0" y="0"/>
-          <a:chExt cx="0" cy="0"/>
-        </a:xfrm>
-      </p:grpSpPr>
-      <p:sp>
-        <p:nvSpPr>
-          <p:cNvPr id="2" name="Title 1">
-            <a:extLst>
-              <a:ext uri="{FF2B5EF4-FFF2-40B4-BE49-F238E27FC236}">
-                <a16:creationId xmlns:a16="http://schemas.microsoft.com/office/drawing/2014/main" id="{C64977BE-A58F-4BF8-BB35-E57044B12E2E}"/>
-              </a:ext>
-            </a:extLst>
-          </p:cNvPr>
-          <p:cNvSpPr>
-            <a:spLocks noGrp="1"/>
-          </p:cNvSpPr>
-          <p:nvPr>
-            <p:ph type="title"/>
-          </p:nvPr>
-        </p:nvSpPr>
-        <p:spPr/>
-        <p:txBody>
-          <a:bodyPr/>
-          <a:lstStyle/>
-          <a:p>
-            <a:r>
-              <a:rPr lang="en-US" dirty="0"/>
-              <a:t>Recursive macros</a:t>
-            </a:r>
-          </a:p>
-        </p:txBody>
-      </p:sp>
-      <p:sp>
-        <p:nvSpPr>
-          <p:cNvPr id="3" name="Content Placeholder 2">
-            <a:extLst>
-              <a:ext uri="{FF2B5EF4-FFF2-40B4-BE49-F238E27FC236}">
-                <a16:creationId xmlns:a16="http://schemas.microsoft.com/office/drawing/2014/main" id="{9E4C13BC-81F6-4E1A-B38F-9DC1E17C3764}"/>
-              </a:ext>
-            </a:extLst>
-          </p:cNvPr>
-          <p:cNvSpPr>
-            <a:spLocks noGrp="1"/>
-          </p:cNvSpPr>
-          <p:nvPr>
-            <p:ph idx="1"/>
-          </p:nvPr>
-        </p:nvSpPr>
-        <p:spPr>
-          <a:noFill/>
-          <a:ln>
-            <a:noFill/>
-          </a:ln>
-        </p:spPr>
-        <p:style>
-          <a:lnRef idx="0">
-            <a:scrgbClr r="0" g="0" b="0"/>
-          </a:lnRef>
-          <a:fillRef idx="0">
-            <a:scrgbClr r="0" g="0" b="0"/>
-          </a:fillRef>
-          <a:effectRef idx="0">
-            <a:scrgbClr r="0" g="0" b="0"/>
-          </a:effectRef>
-          <a:fontRef idx="minor">
-            <a:schemeClr val="dk1"/>
-          </a:fontRef>
-        </p:style>
-        <p:txBody>
-          <a:bodyPr/>
-          <a:lstStyle/>
-          <a:p>
-            <a:pPr marL="0" indent="0">
-              <a:buNone/>
-            </a:pPr>
-            <a:r>
-              <a:rPr lang="en-US" dirty="0"/>
-              <a:t>Macros can expand to other macros</a:t>
-            </a:r>
-          </a:p>
-        </p:txBody>
-      </p:sp>
-      <p:pic>
-        <p:nvPicPr>
-          <p:cNvPr id="4" name="Picture 3">
-            <a:extLst>
-              <a:ext uri="{FF2B5EF4-FFF2-40B4-BE49-F238E27FC236}">
-                <a16:creationId xmlns:a16="http://schemas.microsoft.com/office/drawing/2014/main" id="{2B8511D1-B130-4455-9661-ECB75AB08D90}"/>
-              </a:ext>
-            </a:extLst>
-          </p:cNvPr>
-          <p:cNvPicPr>
-            <a:picLocks noChangeAspect="1"/>
-          </p:cNvPicPr>
-          <p:nvPr/>
-        </p:nvPicPr>
-        <p:blipFill>
-          <a:blip r:embed="rId2"/>
-          <a:stretch>
-            <a:fillRect/>
-          </a:stretch>
-        </p:blipFill>
-        <p:spPr>
-          <a:xfrm>
-            <a:off x="838200" y="2718214"/>
-            <a:ext cx="4682924" cy="3270412"/>
-          </a:xfrm>
-          <a:prstGeom prst="rect">
-            <a:avLst/>
-          </a:prstGeom>
-        </p:spPr>
-      </p:pic>
-      <p:sp>
-        <p:nvSpPr>
-          <p:cNvPr id="5" name="Arrow: Right 4">
-            <a:extLst>
-              <a:ext uri="{FF2B5EF4-FFF2-40B4-BE49-F238E27FC236}">
-                <a16:creationId xmlns:a16="http://schemas.microsoft.com/office/drawing/2014/main" id="{F720756E-D902-4679-9EE3-ECFBBA874F4A}"/>
-              </a:ext>
-            </a:extLst>
-          </p:cNvPr>
-          <p:cNvSpPr/>
-          <p:nvPr/>
-        </p:nvSpPr>
-        <p:spPr>
-          <a:xfrm rot="10800000">
-            <a:off x="4628495" y="3773714"/>
-            <a:ext cx="1785257" cy="333829"/>
-          </a:xfrm>
-          <a:prstGeom prst="rightArrow">
-            <a:avLst/>
-          </a:prstGeom>
-          <a:solidFill>
-            <a:srgbClr val="FFFF00"/>
-          </a:solidFill>
-        </p:spPr>
-        <p:style>
-          <a:lnRef idx="2">
-            <a:schemeClr val="accent1">
-              <a:shade val="50000"/>
-            </a:schemeClr>
-          </a:lnRef>
-          <a:fillRef idx="1">
-            <a:schemeClr val="accent1"/>
-          </a:fillRef>
-          <a:effectRef idx="0">
-            <a:schemeClr val="accent1"/>
-          </a:effectRef>
-          <a:fontRef idx="minor">
-            <a:schemeClr val="lt1"/>
-          </a:fontRef>
-        </p:style>
-        <p:txBody>
-          <a:bodyPr rtlCol="0" anchor="ctr"/>
-          <a:lstStyle/>
-          <a:p>
-            <a:pPr algn="ctr"/>
-            <a:endParaRPr lang="en-US"/>
-          </a:p>
-        </p:txBody>
-      </p:sp>
-      <p:sp>
-        <p:nvSpPr>
-          <p:cNvPr id="6" name="TextBox 5">
-            <a:extLst>
-              <a:ext uri="{FF2B5EF4-FFF2-40B4-BE49-F238E27FC236}">
-                <a16:creationId xmlns:a16="http://schemas.microsoft.com/office/drawing/2014/main" id="{1B027BA8-6560-42BD-8A31-9B02AA02AC11}"/>
-              </a:ext>
-            </a:extLst>
-          </p:cNvPr>
-          <p:cNvSpPr txBox="1"/>
-          <p:nvPr/>
-        </p:nvSpPr>
-        <p:spPr>
-          <a:xfrm>
-            <a:off x="7407728" y="3509172"/>
-            <a:ext cx="3782785" cy="1815882"/>
-          </a:xfrm>
-          <a:prstGeom prst="rect">
-            <a:avLst/>
-          </a:prstGeom>
-          <a:noFill/>
-        </p:spPr>
-        <p:txBody>
-          <a:bodyPr wrap="square" rtlCol="0">
-            <a:spAutoFit/>
-          </a:bodyPr>
-          <a:lstStyle/>
-          <a:p>
-            <a:r>
-              <a:rPr lang="en-US" sz="2800" dirty="0"/>
-              <a:t>But they can also extend to the same macro.</a:t>
-            </a:r>
-          </a:p>
-          <a:p>
-            <a:endParaRPr lang="en-US" sz="2800" dirty="0"/>
-          </a:p>
-          <a:p>
-            <a:r>
-              <a:rPr lang="en-US" sz="2800" dirty="0"/>
-              <a:t>Let’s implement </a:t>
-            </a:r>
-            <a:r>
-              <a:rPr lang="en-US" sz="2800" dirty="0" err="1"/>
-              <a:t>myand</a:t>
-            </a:r>
-            <a:r>
-              <a:rPr lang="en-US" sz="2800" dirty="0"/>
-              <a:t>.</a:t>
-            </a:r>
-          </a:p>
-        </p:txBody>
-      </p:sp>
-    </p:spTree>
-    <p:extLst>
-      <p:ext uri="{BB962C8B-B14F-4D97-AF65-F5344CB8AC3E}">
-        <p14:creationId xmlns:p14="http://schemas.microsoft.com/office/powerpoint/2010/main" val="332350083"/>
-      </p:ext>
-    </p:extLst>
-  </p:cSld>
-  <p:clrMapOvr>
-    <a:masterClrMapping/>
-  </p:clrMapOvr>
-</p:sld>
-</file>
-
-<file path=ppt/slides/slide9.xml><?xml version="1.0" encoding="utf-8"?>
-<p:sld xmlns:a="http://schemas.openxmlformats.org/drawingml/2006/main" xmlns:r="http://schemas.openxmlformats.org/officeDocument/2006/relationships" xmlns:p="http://schemas.openxmlformats.org/presentationml/2006/main">
-  <p:cSld>
-    <p:spTree>
-      <p:nvGrpSpPr>
-        <p:cNvPr id="1" name=""/>
-        <p:cNvGrpSpPr/>
-        <p:nvPr/>
-      </p:nvGrpSpPr>
-      <p:grpSpPr>
-        <a:xfrm>
-          <a:off x="0" y="0"/>
-          <a:ext cx="0" cy="0"/>
-          <a:chOff x="0" y="0"/>
-          <a:chExt cx="0" cy="0"/>
-        </a:xfrm>
-      </p:grpSpPr>
-      <p:sp>
-        <p:nvSpPr>
-          <p:cNvPr id="2" name="Title 1">
-            <a:extLst>
-              <a:ext uri="{FF2B5EF4-FFF2-40B4-BE49-F238E27FC236}">
-                <a16:creationId xmlns:a16="http://schemas.microsoft.com/office/drawing/2014/main" id="{1C1844DE-13D2-47BB-B5EF-DD6724321C73}"/>
-              </a:ext>
-            </a:extLst>
-          </p:cNvPr>
-          <p:cNvSpPr>
-            <a:spLocks noGrp="1"/>
-          </p:cNvSpPr>
-          <p:nvPr>
-            <p:ph type="title"/>
-          </p:nvPr>
-        </p:nvSpPr>
-        <p:spPr/>
-        <p:txBody>
-          <a:bodyPr/>
-          <a:lstStyle/>
-          <a:p>
-            <a:r>
-              <a:rPr lang="en-US" dirty="0"/>
-              <a:t>Limitations of Macros</a:t>
-            </a:r>
-          </a:p>
-        </p:txBody>
-      </p:sp>
-      <p:sp>
-        <p:nvSpPr>
-          <p:cNvPr id="3" name="Content Placeholder 2">
-            <a:extLst>
-              <a:ext uri="{FF2B5EF4-FFF2-40B4-BE49-F238E27FC236}">
-                <a16:creationId xmlns:a16="http://schemas.microsoft.com/office/drawing/2014/main" id="{30FEB9FF-26BB-4155-8955-9F39A4E15121}"/>
-              </a:ext>
-            </a:extLst>
-          </p:cNvPr>
-          <p:cNvSpPr>
-            <a:spLocks noGrp="1"/>
-          </p:cNvSpPr>
-          <p:nvPr>
-            <p:ph idx="1"/>
-          </p:nvPr>
-        </p:nvSpPr>
-        <p:spPr/>
-        <p:txBody>
-          <a:bodyPr>
-            <a:normAutofit fontScale="92500" lnSpcReduction="20000"/>
-          </a:bodyPr>
-          <a:lstStyle/>
-          <a:p>
-            <a:pPr marL="0" indent="0">
-              <a:buNone/>
-            </a:pPr>
-            <a:r>
-              <a:rPr lang="en-US" dirty="0"/>
-              <a:t>(repeat </a:t>
-            </a:r>
-            <a:r>
-              <a:rPr lang="en-US" dirty="0" err="1"/>
-              <a:t>someNumExp</a:t>
-            </a:r>
-            <a:r>
-              <a:rPr lang="en-US" dirty="0"/>
-              <a:t> </a:t>
-            </a:r>
-            <a:r>
-              <a:rPr lang="en-US" dirty="0" err="1"/>
-              <a:t>someExpressionToRepeat</a:t>
-            </a:r>
-            <a:r>
-              <a:rPr lang="en-US" dirty="0"/>
-              <a:t>)</a:t>
-            </a:r>
-          </a:p>
-          <a:p>
-            <a:pPr marL="0" indent="0">
-              <a:buNone/>
-            </a:pPr>
-            <a:endParaRPr lang="en-US" dirty="0"/>
-          </a:p>
-          <a:p>
-            <a:pPr marL="0" indent="0">
-              <a:buNone/>
-            </a:pPr>
-            <a:r>
-              <a:rPr lang="en-US" dirty="0"/>
-              <a:t>e.g. (repeat 3 (display “prints 3 times”))</a:t>
-            </a:r>
-          </a:p>
-          <a:p>
-            <a:pPr marL="0" indent="0">
-              <a:buNone/>
-            </a:pPr>
-            <a:endParaRPr lang="en-US" dirty="0"/>
-          </a:p>
-          <a:p>
-            <a:pPr marL="0" indent="0">
-              <a:buNone/>
-            </a:pPr>
-            <a:r>
-              <a:rPr lang="en-US" dirty="0"/>
-              <a:t>You might be inclined to try and expand this into</a:t>
-            </a:r>
-          </a:p>
-          <a:p>
-            <a:pPr marL="0" indent="0">
-              <a:buNone/>
-            </a:pPr>
-            <a:endParaRPr lang="en-US" dirty="0"/>
-          </a:p>
-          <a:p>
-            <a:pPr marL="0" indent="0">
-              <a:buNone/>
-            </a:pPr>
-            <a:r>
-              <a:rPr lang="en-US" dirty="0"/>
-              <a:t>(begin (display “prints 3 times’) (display “prints 3 times’) (display “prints 3 times’))</a:t>
-            </a:r>
-          </a:p>
-          <a:p>
-            <a:pPr marL="0" indent="0">
-              <a:buNone/>
-            </a:pPr>
-            <a:endParaRPr lang="en-US" dirty="0"/>
-          </a:p>
-          <a:p>
-            <a:pPr marL="0" indent="0">
-              <a:buNone/>
-            </a:pPr>
-            <a:r>
-              <a:rPr lang="en-US" dirty="0"/>
-              <a:t>But this is not a viable approach.  Why?  Hint: consider if </a:t>
-            </a:r>
-            <a:r>
-              <a:rPr lang="en-US" dirty="0" err="1"/>
-              <a:t>someNumExpression</a:t>
-            </a:r>
-            <a:r>
-              <a:rPr lang="en-US" dirty="0"/>
-              <a:t> was something like (+ a b).  </a:t>
-            </a:r>
-          </a:p>
-        </p:txBody>
-      </p:sp>
-    </p:spTree>
-    <p:extLst>
-      <p:ext uri="{BB962C8B-B14F-4D97-AF65-F5344CB8AC3E}">
-        <p14:creationId xmlns:p14="http://schemas.microsoft.com/office/powerpoint/2010/main" val="748589689"/>
       </p:ext>
     </p:extLst>
   </p:cSld>
@@ -7250,23 +6456,6 @@
 </file>
 
 <file path=customXml/item1.xml><?xml version="1.0" encoding="utf-8"?>
-<p:properties xmlns:p="http://schemas.microsoft.com/office/2006/metadata/properties" xmlns:xsi="http://www.w3.org/2001/XMLSchema-instance" xmlns:pc="http://schemas.microsoft.com/office/infopath/2007/PartnerControls">
-  <documentManagement>
-    <_activity xmlns="5f5b6d61-0e5f-41fd-8596-a1256f5a83b0" xsi:nil="true"/>
-  </documentManagement>
-</p:properties>
-</file>
-
-<file path=customXml/item2.xml><?xml version="1.0" encoding="utf-8"?>
-<?mso-contentType ?>
-<FormTemplates xmlns="http://schemas.microsoft.com/sharepoint/v3/contenttype/forms">
-  <Display>DocumentLibraryForm</Display>
-  <Edit>DocumentLibraryForm</Edit>
-  <New>DocumentLibraryForm</New>
-</FormTemplates>
-</file>
-
-<file path=customXml/item3.xml><?xml version="1.0" encoding="utf-8"?>
 <ct:contentTypeSchema xmlns:ct="http://schemas.microsoft.com/office/2006/metadata/contentType" xmlns:ma="http://schemas.microsoft.com/office/2006/metadata/properties/metaAttributes" ct:_="" ma:_="" ma:contentTypeName="Document" ma:contentTypeID="0x01010059CE426D428CEF499B332ADC3ADB3636" ma:contentTypeVersion="15" ma:contentTypeDescription="Create a new document." ma:contentTypeScope="" ma:versionID="33e6dfaf1a47dca333a7629626a3e18d">
   <xsd:schema xmlns:xsd="http://www.w3.org/2001/XMLSchema" xmlns:xs="http://www.w3.org/2001/XMLSchema" xmlns:p="http://schemas.microsoft.com/office/2006/metadata/properties" xmlns:ns3="5f5b6d61-0e5f-41fd-8596-a1256f5a83b0" xmlns:ns4="f0b9717a-2b57-40f9-a089-7ad30d640f15" targetNamespace="http://schemas.microsoft.com/office/2006/metadata/properties" ma:root="true" ma:fieldsID="9fc19125a57afee62d33e895960898df" ns3:_="" ns4:_="">
     <xsd:import namespace="5f5b6d61-0e5f-41fd-8596-a1256f5a83b0"/>
@@ -7501,32 +6690,24 @@
 </ct:contentTypeSchema>
 </file>
 
-<file path=customXml/itemProps1.xml><?xml version="1.0" encoding="utf-8"?>
-<ds:datastoreItem xmlns:ds="http://schemas.openxmlformats.org/officeDocument/2006/customXml" ds:itemID="{CFCE19FC-1E3B-4385-B561-A70641DD138F}">
-  <ds:schemaRefs>
-    <ds:schemaRef ds:uri="http://purl.org/dc/terms/"/>
-    <ds:schemaRef ds:uri="5f5b6d61-0e5f-41fd-8596-a1256f5a83b0"/>
-    <ds:schemaRef ds:uri="http://schemas.microsoft.com/office/2006/documentManagement/types"/>
-    <ds:schemaRef ds:uri="http://purl.org/dc/elements/1.1/"/>
-    <ds:schemaRef ds:uri="http://schemas.openxmlformats.org/package/2006/metadata/core-properties"/>
-    <ds:schemaRef ds:uri="http://www.w3.org/XML/1998/namespace"/>
-    <ds:schemaRef ds:uri="http://purl.org/dc/dcmitype/"/>
-    <ds:schemaRef ds:uri="http://schemas.microsoft.com/office/infopath/2007/PartnerControls"/>
-    <ds:schemaRef ds:uri="f0b9717a-2b57-40f9-a089-7ad30d640f15"/>
-    <ds:schemaRef ds:uri="http://schemas.microsoft.com/office/2006/metadata/properties"/>
-  </ds:schemaRefs>
-</ds:datastoreItem>
+<file path=customXml/item2.xml><?xml version="1.0" encoding="utf-8"?>
+<?mso-contentType ?>
+<FormTemplates xmlns="http://schemas.microsoft.com/sharepoint/v3/contenttype/forms">
+  <Display>DocumentLibraryForm</Display>
+  <Edit>DocumentLibraryForm</Edit>
+  <New>DocumentLibraryForm</New>
+</FormTemplates>
 </file>
 
-<file path=customXml/itemProps2.xml><?xml version="1.0" encoding="utf-8"?>
-<ds:datastoreItem xmlns:ds="http://schemas.openxmlformats.org/officeDocument/2006/customXml" ds:itemID="{DED2AA64-D6BF-4C96-81D2-BFD4DD655D27}">
-  <ds:schemaRefs>
-    <ds:schemaRef ds:uri="http://schemas.microsoft.com/sharepoint/v3/contenttype/forms"/>
-  </ds:schemaRefs>
-</ds:datastoreItem>
+<file path=customXml/item3.xml><?xml version="1.0" encoding="utf-8"?>
+<p:properties xmlns:p="http://schemas.microsoft.com/office/2006/metadata/properties" xmlns:xsi="http://www.w3.org/2001/XMLSchema-instance" xmlns:pc="http://schemas.microsoft.com/office/infopath/2007/PartnerControls">
+  <documentManagement>
+    <_activity xmlns="5f5b6d61-0e5f-41fd-8596-a1256f5a83b0" xsi:nil="true"/>
+  </documentManagement>
+</p:properties>
 </file>
 
-<file path=customXml/itemProps3.xml><?xml version="1.0" encoding="utf-8"?>
+<file path=customXml/itemProps1.xml><?xml version="1.0" encoding="utf-8"?>
 <ds:datastoreItem xmlns:ds="http://schemas.openxmlformats.org/officeDocument/2006/customXml" ds:itemID="{FCA7BE3D-DDE7-44AB-88B9-62FBB530F0A4}">
   <ds:schemaRefs>
     <ds:schemaRef ds:uri="http://schemas.microsoft.com/office/2006/metadata/contentType"/>
@@ -7543,4 +6724,29 @@
     <ds:schemaRef ds:uri="http://schemas.microsoft.com/internal/obd"/>
   </ds:schemaRefs>
 </ds:datastoreItem>
+</file>
+
+<file path=customXml/itemProps2.xml><?xml version="1.0" encoding="utf-8"?>
+<ds:datastoreItem xmlns:ds="http://schemas.openxmlformats.org/officeDocument/2006/customXml" ds:itemID="{DED2AA64-D6BF-4C96-81D2-BFD4DD655D27}">
+  <ds:schemaRefs>
+    <ds:schemaRef ds:uri="http://schemas.microsoft.com/sharepoint/v3/contenttype/forms"/>
+  </ds:schemaRefs>
+</ds:datastoreItem>
+</file>
+
+<file path=customXml/itemProps3.xml><?xml version="1.0" encoding="utf-8"?>
+<ds:datastoreItem xmlns:ds="http://schemas.openxmlformats.org/officeDocument/2006/customXml" ds:itemID="{CFCE19FC-1E3B-4385-B561-A70641DD138F}">
+  <ds:schemaRefs>
+    <ds:schemaRef ds:uri="http://purl.org/dc/terms/"/>
+    <ds:schemaRef ds:uri="5f5b6d61-0e5f-41fd-8596-a1256f5a83b0"/>
+    <ds:schemaRef ds:uri="http://schemas.microsoft.com/office/2006/documentManagement/types"/>
+    <ds:schemaRef ds:uri="http://purl.org/dc/elements/1.1/"/>
+    <ds:schemaRef ds:uri="http://schemas.openxmlformats.org/package/2006/metadata/core-properties"/>
+    <ds:schemaRef ds:uri="http://www.w3.org/XML/1998/namespace"/>
+    <ds:schemaRef ds:uri="http://purl.org/dc/dcmitype/"/>
+    <ds:schemaRef ds:uri="http://schemas.microsoft.com/office/infopath/2007/PartnerControls"/>
+    <ds:schemaRef ds:uri="f0b9717a-2b57-40f9-a089-7ad30d640f15"/>
+    <ds:schemaRef ds:uri="http://schemas.microsoft.com/office/2006/metadata/properties"/>
+  </ds:schemaRefs>
+</ds:datastoreItem>
 </file>
</xml_diff>